<commit_message>
update AQ-S3VSVM col scale
</commit_message>
<xml_diff>
--- a/docs/AQ-S3VSVM_preview.pptx
+++ b/docs/AQ-S3VSVM_preview.pptx
@@ -246,7 +246,7 @@
           <a:p>
             <a:fld id="{CE0980D6-5DF0-463D-BFB7-BC7EA5530348}" type="datetimeFigureOut">
               <a:rPr lang="de-DE" smtClean="0"/>
-              <a:t>01.10.2025</a:t>
+              <a:t>09.10.2025</a:t>
             </a:fld>
             <a:endParaRPr lang="de-DE"/>
           </a:p>
@@ -423,7 +423,7 @@
           <a:p>
             <a:fld id="{2E535C94-B646-4D4D-A5E3-882C7E78FF5D}" type="datetimeFigureOut">
               <a:rPr lang="de-DE" smtClean="0"/>
-              <a:t>01.10.2025</a:t>
+              <a:t>09.10.2025</a:t>
             </a:fld>
             <a:endParaRPr lang="de-DE"/>
           </a:p>
@@ -28199,42 +28199,6 @@
           </a:p>
         </p:txBody>
       </p:sp>
-      <p:pic>
-        <p:nvPicPr>
-          <p:cNvPr id="14" name="Picture 13">
-            <a:extLst>
-              <a:ext uri="{FF2B5EF4-FFF2-40B4-BE49-F238E27FC236}">
-                <a16:creationId xmlns:a16="http://schemas.microsoft.com/office/drawing/2014/main" id="{A07631CB-C7C8-4C8A-BD9C-766891AC1E6C}"/>
-              </a:ext>
-            </a:extLst>
-          </p:cNvPr>
-          <p:cNvPicPr>
-            <a:picLocks noChangeAspect="1"/>
-          </p:cNvPicPr>
-          <p:nvPr/>
-        </p:nvPicPr>
-        <p:blipFill>
-          <a:blip r:embed="rId2">
-            <a:extLst>
-              <a:ext uri="{28A0092B-C50C-407E-A947-70E740481C1C}">
-                <a14:useLocalDpi xmlns:a14="http://schemas.microsoft.com/office/drawing/2010/main" val="0"/>
-              </a:ext>
-            </a:extLst>
-          </a:blip>
-          <a:stretch>
-            <a:fillRect/>
-          </a:stretch>
-        </p:blipFill>
-        <p:spPr>
-          <a:xfrm>
-            <a:off x="3257550" y="1184973"/>
-            <a:ext cx="6949678" cy="4346378"/>
-          </a:xfrm>
-          <a:prstGeom prst="rect">
-            <a:avLst/>
-          </a:prstGeom>
-        </p:spPr>
-      </p:pic>
       <p:sp>
         <p:nvSpPr>
           <p:cNvPr id="3" name="TextBox 2">
@@ -28280,6 +28244,42 @@
           </a:p>
         </p:txBody>
       </p:sp>
+      <p:pic>
+        <p:nvPicPr>
+          <p:cNvPr id="10" name="Picture 9" descr="A screenshot of a computer screen&#10;&#10;AI-generated content may be incorrect.">
+            <a:extLst>
+              <a:ext uri="{FF2B5EF4-FFF2-40B4-BE49-F238E27FC236}">
+                <a16:creationId xmlns:a16="http://schemas.microsoft.com/office/drawing/2014/main" id="{456AD173-5577-D447-8C16-B8A609997034}"/>
+              </a:ext>
+            </a:extLst>
+          </p:cNvPr>
+          <p:cNvPicPr>
+            <a:picLocks noChangeAspect="1"/>
+          </p:cNvPicPr>
+          <p:nvPr/>
+        </p:nvPicPr>
+        <p:blipFill>
+          <a:blip r:embed="rId2">
+            <a:extLst>
+              <a:ext uri="{28A0092B-C50C-407E-A947-70E740481C1C}">
+                <a14:useLocalDpi xmlns:a14="http://schemas.microsoft.com/office/drawing/2010/main" val="0"/>
+              </a:ext>
+            </a:extLst>
+          </a:blip>
+          <a:stretch>
+            <a:fillRect/>
+          </a:stretch>
+        </p:blipFill>
+        <p:spPr>
+          <a:xfrm>
+            <a:off x="3215567" y="1210915"/>
+            <a:ext cx="6991661" cy="4320436"/>
+          </a:xfrm>
+          <a:prstGeom prst="rect">
+            <a:avLst/>
+          </a:prstGeom>
+        </p:spPr>
+      </p:pic>
     </p:spTree>
     <p:extLst>
       <p:ext uri="{BB962C8B-B14F-4D97-AF65-F5344CB8AC3E}">
@@ -28405,10 +28405,10 @@
       </p:sp>
       <p:pic>
         <p:nvPicPr>
-          <p:cNvPr id="7" name="Picture 6" descr="A computer screen shot of a diagram">
-            <a:extLst>
-              <a:ext uri="{FF2B5EF4-FFF2-40B4-BE49-F238E27FC236}">
-                <a16:creationId xmlns:a16="http://schemas.microsoft.com/office/drawing/2014/main" id="{05E12099-3D0F-5E04-D5C7-AC1CB36AF283}"/>
+          <p:cNvPr id="3" name="Picture 2" descr="A screenshot of a computer">
+            <a:extLst>
+              <a:ext uri="{FF2B5EF4-FFF2-40B4-BE49-F238E27FC236}">
+                <a16:creationId xmlns:a16="http://schemas.microsoft.com/office/drawing/2014/main" id="{56ACC513-FAD6-A203-1586-07F809B78BA3}"/>
               </a:ext>
             </a:extLst>
           </p:cNvPr>
@@ -28431,8 +28431,8 @@
         </p:blipFill>
         <p:spPr>
           <a:xfrm>
-            <a:off x="2926161" y="1628775"/>
-            <a:ext cx="6389468" cy="4017059"/>
+            <a:off x="2891362" y="1628776"/>
+            <a:ext cx="6424267" cy="4017058"/>
           </a:xfrm>
           <a:prstGeom prst="rect">
             <a:avLst/>

</xml_diff>